<commit_message>
Präsi3 mit einem Bild
</commit_message>
<xml_diff>
--- a/Presentation3.pptx
+++ b/Presentation3.pptx
@@ -4109,8 +4109,8 @@
         </p:nvSpPr>
         <p:spPr>
           <a:xfrm>
-            <a:off x="1094321" y="3579920"/>
-            <a:ext cx="10200443" cy="430887"/>
+            <a:off x="1026258" y="3429000"/>
+            <a:ext cx="10200443" cy="769441"/>
           </a:xfrm>
           <a:prstGeom prst="rect">
             <a:avLst/>
@@ -4125,7 +4125,7 @@
           <a:p>
             <a:r>
               <a:rPr lang="en-GB" sz="2200" dirty="0"/>
-              <a:t>Build a delivery platform which mainly focuses on the deliverers interests</a:t>
+              <a:t>Build a delivery platform which connects package suppliers with delivery drivers and mainly focuses on the deliverers interests</a:t>
             </a:r>
           </a:p>
         </p:txBody>
@@ -4992,6 +4992,53 @@
           </a:p>
         </p:txBody>
       </p:sp>
+      <p:pic>
+        <p:nvPicPr>
+          <p:cNvPr id="1026" name="Picture 2">
+            <a:extLst>
+              <a:ext uri="{FF2B5EF4-FFF2-40B4-BE49-F238E27FC236}">
+                <a16:creationId xmlns:a16="http://schemas.microsoft.com/office/drawing/2014/main" id="{7B3CFD3A-D5FB-469F-B47E-ABA5A2D413C8}"/>
+              </a:ext>
+            </a:extLst>
+          </p:cNvPr>
+          <p:cNvPicPr>
+            <a:picLocks noChangeAspect="1" noChangeArrowheads="1"/>
+          </p:cNvPicPr>
+          <p:nvPr/>
+        </p:nvPicPr>
+        <p:blipFill>
+          <a:blip r:embed="rId2">
+            <a:extLst>
+              <a:ext uri="{28A0092B-C50C-407E-A947-70E740481C1C}">
+                <a14:useLocalDpi xmlns:a14="http://schemas.microsoft.com/office/drawing/2010/main" val="0"/>
+              </a:ext>
+            </a:extLst>
+          </a:blip>
+          <a:srcRect/>
+          <a:stretch>
+            <a:fillRect/>
+          </a:stretch>
+        </p:blipFill>
+        <p:spPr bwMode="auto">
+          <a:xfrm>
+            <a:off x="9137514" y="2099199"/>
+            <a:ext cx="2247800" cy="4146240"/>
+          </a:xfrm>
+          <a:prstGeom prst="rect">
+            <a:avLst/>
+          </a:prstGeom>
+          <a:noFill/>
+          <a:extLst>
+            <a:ext uri="{909E8E84-426E-40DD-AFC4-6F175D3DCCD1}">
+              <a14:hiddenFill xmlns:a14="http://schemas.microsoft.com/office/drawing/2010/main">
+                <a:solidFill>
+                  <a:srgbClr val="FFFFFF"/>
+                </a:solidFill>
+              </a14:hiddenFill>
+            </a:ext>
+          </a:extLst>
+        </p:spPr>
+      </p:pic>
     </p:spTree>
     <p:extLst>
       <p:ext uri="{BB962C8B-B14F-4D97-AF65-F5344CB8AC3E}">
@@ -5421,7 +5468,7 @@
             </a:pPr>
             <a:r>
               <a:rPr lang="en-GB" sz="2000" dirty="0"/>
-              <a:t>Implement rankings in different areas</a:t>
+              <a:t>Implement rankings in different areas such as covered distance</a:t>
             </a:r>
           </a:p>
           <a:p>

</xml_diff>